<commit_message>
version 1.0- vor Zusammenführung Ms1
</commit_message>
<xml_diff>
--- a/Meilenstein1/Firmenpräsentation.pptx
+++ b/Meilenstein1/Firmenpräsentation.pptx
@@ -5,7 +5,7 @@
     <p:sldMasterId id="2147483756" r:id="rId1"/>
   </p:sldMasterIdLst>
   <p:notesMasterIdLst>
-    <p:notesMasterId r:id="rId15"/>
+    <p:notesMasterId r:id="rId16"/>
   </p:notesMasterIdLst>
   <p:sldIdLst>
     <p:sldId id="269" r:id="rId2"/>
@@ -16,11 +16,12 @@
     <p:sldId id="271" r:id="rId7"/>
     <p:sldId id="262" r:id="rId8"/>
     <p:sldId id="267" r:id="rId9"/>
-    <p:sldId id="273" r:id="rId10"/>
-    <p:sldId id="268" r:id="rId11"/>
-    <p:sldId id="261" r:id="rId12"/>
+    <p:sldId id="261" r:id="rId10"/>
+    <p:sldId id="273" r:id="rId11"/>
+    <p:sldId id="268" r:id="rId12"/>
     <p:sldId id="270" r:id="rId13"/>
-    <p:sldId id="272" r:id="rId14"/>
+    <p:sldId id="274" r:id="rId14"/>
+    <p:sldId id="272" r:id="rId15"/>
   </p:sldIdLst>
   <p:sldSz cx="12192000" cy="6858000"/>
   <p:notesSz cx="6858000" cy="9144000"/>
@@ -3781,6 +3782,172 @@
 </file>
 
 <file path=ppt/slides/slide1.xml><?xml version="1.0" encoding="utf-8"?>
+<p:sld xmlns:a="http://schemas.openxmlformats.org/drawingml/2006/main" xmlns:r="http://schemas.openxmlformats.org/officeDocument/2006/relationships" xmlns:p="http://schemas.openxmlformats.org/presentationml/2006/main" show="0">
+  <p:cSld>
+    <p:bg>
+      <p:bgPr>
+        <a:solidFill>
+          <a:srgbClr val="4960A6"/>
+        </a:solidFill>
+        <a:effectLst/>
+      </p:bgPr>
+    </p:bg>
+    <p:spTree>
+      <p:nvGrpSpPr>
+        <p:cNvPr id="1" name=""/>
+        <p:cNvGrpSpPr/>
+        <p:nvPr/>
+      </p:nvGrpSpPr>
+      <p:grpSpPr>
+        <a:xfrm>
+          <a:off x="0" y="0"/>
+          <a:ext cx="0" cy="0"/>
+          <a:chOff x="0" y="0"/>
+          <a:chExt cx="0" cy="0"/>
+        </a:xfrm>
+      </p:grpSpPr>
+      <p:sp>
+        <p:nvSpPr>
+          <p:cNvPr id="22" name="Rectangle 21">
+            <a:extLst>
+              <a:ext uri="{FF2B5EF4-FFF2-40B4-BE49-F238E27FC236}">
+                <a16:creationId xmlns:a16="http://schemas.microsoft.com/office/drawing/2014/main" id="{44B3F5F5-166C-4694-B20A-3F8218AF7D03}"/>
+              </a:ext>
+              <a:ext uri="{C183D7F6-B498-43B3-948B-1728B52AA6E4}">
+                <adec:decorative xmlns:adec="http://schemas.microsoft.com/office/drawing/2017/decorative" val="1"/>
+              </a:ext>
+            </a:extLst>
+          </p:cNvPr>
+          <p:cNvSpPr>
+            <a:spLocks noGrp="1" noRot="1" noChangeAspect="1" noMove="1" noResize="1" noEditPoints="1" noAdjustHandles="1" noChangeArrowheads="1" noChangeShapeType="1" noTextEdit="1"/>
+          </p:cNvSpPr>
+          <p:nvPr>
+            <p:extLst>
+              <p:ext uri="{386F3935-93C4-4BCD-93E2-E3B085C9AB24}">
+                <p16:designElem xmlns:p16="http://schemas.microsoft.com/office/powerpoint/2015/main" val="1"/>
+              </p:ext>
+            </p:extLst>
+          </p:nvPr>
+        </p:nvSpPr>
+        <p:spPr>
+          <a:xfrm>
+            <a:off x="0" y="0"/>
+            <a:ext cx="12192000" cy="6858000"/>
+          </a:xfrm>
+          <a:prstGeom prst="rect">
+            <a:avLst/>
+          </a:prstGeom>
+          <a:solidFill>
+            <a:schemeClr val="bg2"/>
+          </a:solidFill>
+          <a:ln>
+            <a:noFill/>
+          </a:ln>
+        </p:spPr>
+        <p:style>
+          <a:lnRef idx="2">
+            <a:schemeClr val="accent1">
+              <a:shade val="50000"/>
+            </a:schemeClr>
+          </a:lnRef>
+          <a:fillRef idx="1">
+            <a:schemeClr val="accent1"/>
+          </a:fillRef>
+          <a:effectRef idx="0">
+            <a:schemeClr val="accent1"/>
+          </a:effectRef>
+          <a:fontRef idx="minor">
+            <a:schemeClr val="lt1"/>
+          </a:fontRef>
+        </p:style>
+        <p:txBody>
+          <a:bodyPr rtlCol="0" anchor="ctr"/>
+          <a:lstStyle/>
+          <a:p>
+            <a:pPr algn="ctr"/>
+            <a:endParaRPr lang="en-US"/>
+          </a:p>
+        </p:txBody>
+      </p:sp>
+      <p:sp>
+        <p:nvSpPr>
+          <p:cNvPr id="24" name="Rectangle 23">
+            <a:extLst>
+              <a:ext uri="{FF2B5EF4-FFF2-40B4-BE49-F238E27FC236}">
+                <a16:creationId xmlns:a16="http://schemas.microsoft.com/office/drawing/2014/main" id="{9E67A204-FB90-4B26-B155-3FA8064AD2DF}"/>
+              </a:ext>
+              <a:ext uri="{C183D7F6-B498-43B3-948B-1728B52AA6E4}">
+                <adec:decorative xmlns:adec="http://schemas.microsoft.com/office/drawing/2017/decorative" val="1"/>
+              </a:ext>
+            </a:extLst>
+          </p:cNvPr>
+          <p:cNvSpPr>
+            <a:spLocks noGrp="1" noRot="1" noChangeAspect="1" noMove="1" noResize="1" noEditPoints="1" noAdjustHandles="1" noChangeArrowheads="1" noChangeShapeType="1" noTextEdit="1"/>
+          </p:cNvSpPr>
+          <p:nvPr>
+            <p:extLst>
+              <p:ext uri="{386F3935-93C4-4BCD-93E2-E3B085C9AB24}">
+                <p16:designElem xmlns:p16="http://schemas.microsoft.com/office/powerpoint/2015/main" val="1"/>
+              </p:ext>
+            </p:extLst>
+          </p:nvPr>
+        </p:nvSpPr>
+        <p:spPr>
+          <a:xfrm>
+            <a:off x="477012" y="480060"/>
+            <a:ext cx="11237976" cy="5897880"/>
+          </a:xfrm>
+          <a:prstGeom prst="rect">
+            <a:avLst/>
+          </a:prstGeom>
+          <a:solidFill>
+            <a:schemeClr val="bg1"/>
+          </a:solidFill>
+          <a:ln w="22225">
+            <a:solidFill>
+              <a:srgbClr val="C17F63"/>
+            </a:solidFill>
+          </a:ln>
+        </p:spPr>
+        <p:style>
+          <a:lnRef idx="2">
+            <a:schemeClr val="accent1">
+              <a:shade val="50000"/>
+            </a:schemeClr>
+          </a:lnRef>
+          <a:fillRef idx="1">
+            <a:schemeClr val="accent1"/>
+          </a:fillRef>
+          <a:effectRef idx="0">
+            <a:schemeClr val="accent1"/>
+          </a:effectRef>
+          <a:fontRef idx="minor">
+            <a:schemeClr val="lt1"/>
+          </a:fontRef>
+        </p:style>
+        <p:txBody>
+          <a:bodyPr rtlCol="0" anchor="ctr"/>
+          <a:lstStyle/>
+          <a:p>
+            <a:pPr algn="ctr"/>
+            <a:endParaRPr lang="en-US"/>
+          </a:p>
+        </p:txBody>
+      </p:sp>
+    </p:spTree>
+    <p:extLst>
+      <p:ext uri="{BB962C8B-B14F-4D97-AF65-F5344CB8AC3E}">
+        <p14:creationId xmlns:p14="http://schemas.microsoft.com/office/powerpoint/2010/main" val="4080306412"/>
+      </p:ext>
+    </p:extLst>
+  </p:cSld>
+  <p:clrMapOvr>
+    <a:masterClrMapping/>
+  </p:clrMapOvr>
+</p:sld>
+</file>
+
+<file path=ppt/slides/slide10.xml><?xml version="1.0" encoding="utf-8"?>
 <p:sld xmlns:a="http://schemas.openxmlformats.org/drawingml/2006/main" xmlns:r="http://schemas.openxmlformats.org/officeDocument/2006/relationships" xmlns:p="http://schemas.openxmlformats.org/presentationml/2006/main">
   <p:cSld>
     <p:bg>
@@ -3933,10 +4100,81 @@
           </a:p>
         </p:txBody>
       </p:sp>
+      <p:pic>
+        <p:nvPicPr>
+          <p:cNvPr id="3" name="Grafik 2" descr="Ein Bild, das schwimmend, grün, sitzend, haltend enthält.&#10;&#10;Automatisch generierte Beschreibung">
+            <a:extLst>
+              <a:ext uri="{FF2B5EF4-FFF2-40B4-BE49-F238E27FC236}">
+                <a16:creationId xmlns:a16="http://schemas.microsoft.com/office/drawing/2014/main" id="{79A94BF5-5C1D-4210-B325-A8962E06FB12}"/>
+              </a:ext>
+            </a:extLst>
+          </p:cNvPr>
+          <p:cNvPicPr>
+            <a:picLocks noChangeAspect="1"/>
+          </p:cNvPicPr>
+          <p:nvPr/>
+        </p:nvPicPr>
+        <p:blipFill>
+          <a:blip r:embed="rId2">
+            <a:extLst>
+              <a:ext uri="{28A0092B-C50C-407E-A947-70E740481C1C}">
+                <a14:useLocalDpi xmlns:a14="http://schemas.microsoft.com/office/drawing/2010/main" val="0"/>
+              </a:ext>
+            </a:extLst>
+          </a:blip>
+          <a:stretch>
+            <a:fillRect/>
+          </a:stretch>
+        </p:blipFill>
+        <p:spPr>
+          <a:xfrm>
+            <a:off x="1153668" y="1263115"/>
+            <a:ext cx="9884664" cy="5073075"/>
+          </a:xfrm>
+          <a:prstGeom prst="rect">
+            <a:avLst/>
+          </a:prstGeom>
+        </p:spPr>
+      </p:pic>
+      <p:sp>
+        <p:nvSpPr>
+          <p:cNvPr id="4" name="Textfeld 3">
+            <a:extLst>
+              <a:ext uri="{FF2B5EF4-FFF2-40B4-BE49-F238E27FC236}">
+                <a16:creationId xmlns:a16="http://schemas.microsoft.com/office/drawing/2014/main" id="{E5DEB3FE-FEC3-4ACC-B79E-F749C8194B3C}"/>
+              </a:ext>
+            </a:extLst>
+          </p:cNvPr>
+          <p:cNvSpPr txBox="1"/>
+          <p:nvPr/>
+        </p:nvSpPr>
+        <p:spPr>
+          <a:xfrm>
+            <a:off x="2373282" y="548422"/>
+            <a:ext cx="7445436" cy="646331"/>
+          </a:xfrm>
+          <a:prstGeom prst="rect">
+            <a:avLst/>
+          </a:prstGeom>
+          <a:noFill/>
+        </p:spPr>
+        <p:txBody>
+          <a:bodyPr wrap="none" rtlCol="0">
+            <a:spAutoFit/>
+          </a:bodyPr>
+          <a:lstStyle/>
+          <a:p>
+            <a:r>
+              <a:rPr lang="de-DE" sz="3600" dirty="0"/>
+              <a:t>Vollständig automatisierte Algenfarmen</a:t>
+            </a:r>
+          </a:p>
+        </p:txBody>
+      </p:sp>
     </p:spTree>
     <p:extLst>
       <p:ext uri="{BB962C8B-B14F-4D97-AF65-F5344CB8AC3E}">
-        <p14:creationId xmlns:p14="http://schemas.microsoft.com/office/powerpoint/2010/main" val="4080306412"/>
+        <p14:creationId xmlns:p14="http://schemas.microsoft.com/office/powerpoint/2010/main" val="112858198"/>
       </p:ext>
     </p:extLst>
   </p:cSld>
@@ -3946,7 +4184,7 @@
 </p:sld>
 </file>
 
-<file path=ppt/slides/slide10.xml><?xml version="1.0" encoding="utf-8"?>
+<file path=ppt/slides/slide11.xml><?xml version="1.0" encoding="utf-8"?>
 <p:sld xmlns:a="http://schemas.openxmlformats.org/drawingml/2006/main" xmlns:r="http://schemas.openxmlformats.org/officeDocument/2006/relationships" xmlns:p="http://schemas.openxmlformats.org/presentationml/2006/main">
   <p:cSld>
     <p:bg>
@@ -4892,307 +5130,6 @@
 </p:sld>
 </file>
 
-<file path=ppt/slides/slide11.xml><?xml version="1.0" encoding="utf-8"?>
-<p:sld xmlns:a="http://schemas.openxmlformats.org/drawingml/2006/main" xmlns:r="http://schemas.openxmlformats.org/officeDocument/2006/relationships" xmlns:p="http://schemas.openxmlformats.org/presentationml/2006/main">
-  <p:cSld>
-    <p:bg>
-      <p:bgPr>
-        <a:solidFill>
-          <a:srgbClr val="4960A6"/>
-        </a:solidFill>
-        <a:effectLst/>
-      </p:bgPr>
-    </p:bg>
-    <p:spTree>
-      <p:nvGrpSpPr>
-        <p:cNvPr id="1" name=""/>
-        <p:cNvGrpSpPr/>
-        <p:nvPr/>
-      </p:nvGrpSpPr>
-      <p:grpSpPr>
-        <a:xfrm>
-          <a:off x="0" y="0"/>
-          <a:ext cx="0" cy="0"/>
-          <a:chOff x="0" y="0"/>
-          <a:chExt cx="0" cy="0"/>
-        </a:xfrm>
-      </p:grpSpPr>
-      <p:cxnSp>
-        <p:nvCxnSpPr>
-          <p:cNvPr id="7" name="Straight Connector 6">
-            <a:extLst>
-              <a:ext uri="{FF2B5EF4-FFF2-40B4-BE49-F238E27FC236}">
-                <a16:creationId xmlns:a16="http://schemas.microsoft.com/office/drawing/2014/main" id="{8CED2307-F79F-42F9-B81B-91F768E72BFC}"/>
-              </a:ext>
-              <a:ext uri="{C183D7F6-B498-43B3-948B-1728B52AA6E4}">
-                <adec:decorative xmlns:adec="http://schemas.microsoft.com/office/drawing/2017/decorative" val="1"/>
-              </a:ext>
-            </a:extLst>
-          </p:cNvPr>
-          <p:cNvCxnSpPr>
-            <a:cxnSpLocks noGrp="1" noRot="1" noChangeAspect="1" noMove="1" noResize="1" noEditPoints="1" noAdjustHandles="1" noChangeArrowheads="1" noChangeShapeType="1"/>
-          </p:cNvCxnSpPr>
-          <p:nvPr>
-            <p:extLst>
-              <p:ext uri="{386F3935-93C4-4BCD-93E2-E3B085C9AB24}">
-                <p16:designElem xmlns:p16="http://schemas.microsoft.com/office/powerpoint/2015/main" val="1"/>
-              </p:ext>
-            </p:extLst>
-          </p:nvPr>
-        </p:nvCxnSpPr>
-        <p:spPr>
-          <a:xfrm flipV="1">
-            <a:off x="8386842" y="5264106"/>
-            <a:ext cx="0" cy="914400"/>
-          </a:xfrm>
-          <a:prstGeom prst="line">
-            <a:avLst/>
-          </a:prstGeom>
-          <a:ln w="19050">
-            <a:solidFill>
-              <a:schemeClr val="accent2"/>
-            </a:solidFill>
-          </a:ln>
-        </p:spPr>
-        <p:style>
-          <a:lnRef idx="1">
-            <a:schemeClr val="accent1"/>
-          </a:lnRef>
-          <a:fillRef idx="0">
-            <a:schemeClr val="accent1"/>
-          </a:fillRef>
-          <a:effectRef idx="0">
-            <a:schemeClr val="accent1"/>
-          </a:effectRef>
-          <a:fontRef idx="minor">
-            <a:schemeClr val="tx1"/>
-          </a:fontRef>
-        </p:style>
-      </p:cxnSp>
-      <p:sp>
-        <p:nvSpPr>
-          <p:cNvPr id="9" name="Rectangle 8">
-            <a:extLst>
-              <a:ext uri="{FF2B5EF4-FFF2-40B4-BE49-F238E27FC236}">
-                <a16:creationId xmlns:a16="http://schemas.microsoft.com/office/drawing/2014/main" id="{E5DB38FF-CE38-4D82-B9F2-DFE28A0194E1}"/>
-              </a:ext>
-              <a:ext uri="{C183D7F6-B498-43B3-948B-1728B52AA6E4}">
-                <adec:decorative xmlns:adec="http://schemas.microsoft.com/office/drawing/2017/decorative" val="1"/>
-              </a:ext>
-            </a:extLst>
-          </p:cNvPr>
-          <p:cNvSpPr>
-            <a:spLocks noGrp="1" noRot="1" noChangeAspect="1" noMove="1" noResize="1" noEditPoints="1" noAdjustHandles="1" noChangeArrowheads="1" noChangeShapeType="1" noTextEdit="1"/>
-          </p:cNvSpPr>
-          <p:nvPr>
-            <p:extLst>
-              <p:ext uri="{386F3935-93C4-4BCD-93E2-E3B085C9AB24}">
-                <p16:designElem xmlns:p16="http://schemas.microsoft.com/office/powerpoint/2015/main" val="1"/>
-              </p:ext>
-            </p:extLst>
-          </p:nvPr>
-        </p:nvSpPr>
-        <p:spPr>
-          <a:xfrm>
-            <a:off x="0" y="-1"/>
-            <a:ext cx="12192000" cy="4572001"/>
-          </a:xfrm>
-          <a:prstGeom prst="rect">
-            <a:avLst/>
-          </a:prstGeom>
-          <a:solidFill>
-            <a:schemeClr val="accent2"/>
-          </a:solidFill>
-          <a:ln>
-            <a:noFill/>
-          </a:ln>
-        </p:spPr>
-        <p:style>
-          <a:lnRef idx="2">
-            <a:schemeClr val="accent1">
-              <a:shade val="50000"/>
-            </a:schemeClr>
-          </a:lnRef>
-          <a:fillRef idx="1">
-            <a:schemeClr val="accent1"/>
-          </a:fillRef>
-          <a:effectRef idx="0">
-            <a:schemeClr val="accent1"/>
-          </a:effectRef>
-          <a:fontRef idx="minor">
-            <a:schemeClr val="lt1"/>
-          </a:fontRef>
-        </p:style>
-      </p:sp>
-      <p:sp useBgFill="1">
-        <p:nvSpPr>
-          <p:cNvPr id="11" name="Rectangle 10">
-            <a:extLst>
-              <a:ext uri="{FF2B5EF4-FFF2-40B4-BE49-F238E27FC236}">
-                <a16:creationId xmlns:a16="http://schemas.microsoft.com/office/drawing/2014/main" id="{0BA28970-3E8F-46CD-A302-42EE83668B0A}"/>
-              </a:ext>
-              <a:ext uri="{C183D7F6-B498-43B3-948B-1728B52AA6E4}">
-                <adec:decorative xmlns:adec="http://schemas.microsoft.com/office/drawing/2017/decorative" val="1"/>
-              </a:ext>
-            </a:extLst>
-          </p:cNvPr>
-          <p:cNvSpPr>
-            <a:spLocks noGrp="1" noRot="1" noChangeAspect="1" noMove="1" noResize="1" noEditPoints="1" noAdjustHandles="1" noChangeArrowheads="1" noChangeShapeType="1" noTextEdit="1"/>
-          </p:cNvSpPr>
-          <p:nvPr>
-            <p:extLst>
-              <p:ext uri="{386F3935-93C4-4BCD-93E2-E3B085C9AB24}">
-                <p16:designElem xmlns:p16="http://schemas.microsoft.com/office/powerpoint/2015/main" val="1"/>
-              </p:ext>
-            </p:extLst>
-          </p:nvPr>
-        </p:nvSpPr>
-        <p:spPr>
-          <a:xfrm>
-            <a:off x="0" y="0"/>
-            <a:ext cx="12192000" cy="6858000"/>
-          </a:xfrm>
-          <a:prstGeom prst="rect">
-            <a:avLst/>
-          </a:prstGeom>
-          <a:ln>
-            <a:noFill/>
-          </a:ln>
-        </p:spPr>
-        <p:style>
-          <a:lnRef idx="2">
-            <a:schemeClr val="accent1">
-              <a:shade val="50000"/>
-            </a:schemeClr>
-          </a:lnRef>
-          <a:fillRef idx="1">
-            <a:schemeClr val="accent1"/>
-          </a:fillRef>
-          <a:effectRef idx="0">
-            <a:schemeClr val="accent1"/>
-          </a:effectRef>
-          <a:fontRef idx="minor">
-            <a:schemeClr val="lt1"/>
-          </a:fontRef>
-        </p:style>
-        <p:txBody>
-          <a:bodyPr rtlCol="0" anchor="ctr"/>
-          <a:lstStyle/>
-          <a:p>
-            <a:pPr algn="ctr"/>
-            <a:endParaRPr lang="en-US"/>
-          </a:p>
-        </p:txBody>
-      </p:sp>
-      <p:sp>
-        <p:nvSpPr>
-          <p:cNvPr id="2" name="Titel 1">
-            <a:extLst>
-              <a:ext uri="{FF2B5EF4-FFF2-40B4-BE49-F238E27FC236}">
-                <a16:creationId xmlns:a16="http://schemas.microsoft.com/office/drawing/2014/main" id="{9EE936F0-62E4-40F1-BA06-11DDD134B512}"/>
-              </a:ext>
-            </a:extLst>
-          </p:cNvPr>
-          <p:cNvSpPr>
-            <a:spLocks noGrp="1"/>
-          </p:cNvSpPr>
-          <p:nvPr>
-            <p:ph type="title" idx="4294967295"/>
-          </p:nvPr>
-        </p:nvSpPr>
-        <p:spPr>
-          <a:xfrm>
-            <a:off x="643467" y="643467"/>
-            <a:ext cx="7164674" cy="5571066"/>
-          </a:xfrm>
-        </p:spPr>
-        <p:txBody>
-          <a:bodyPr vert="horz" lIns="91440" tIns="45720" rIns="91440" bIns="45720" rtlCol="0" anchor="ctr">
-            <a:normAutofit/>
-          </a:bodyPr>
-          <a:lstStyle/>
-          <a:p>
-            <a:pPr algn="r"/>
-            <a:r>
-              <a:rPr lang="en-US" sz="6600" spc="200">
-                <a:solidFill>
-                  <a:schemeClr val="tx1">
-                    <a:alpha val="80000"/>
-                  </a:schemeClr>
-                </a:solidFill>
-              </a:rPr>
-              <a:t>Wie können wir das erreichen?</a:t>
-            </a:r>
-          </a:p>
-        </p:txBody>
-      </p:sp>
-      <p:cxnSp>
-        <p:nvCxnSpPr>
-          <p:cNvPr id="13" name="Straight Connector 12">
-            <a:extLst>
-              <a:ext uri="{FF2B5EF4-FFF2-40B4-BE49-F238E27FC236}">
-                <a16:creationId xmlns:a16="http://schemas.microsoft.com/office/drawing/2014/main" id="{47AE7893-212D-45CB-A5B0-AE377389AB3F}"/>
-              </a:ext>
-              <a:ext uri="{C183D7F6-B498-43B3-948B-1728B52AA6E4}">
-                <adec:decorative xmlns:adec="http://schemas.microsoft.com/office/drawing/2017/decorative" val="1"/>
-              </a:ext>
-            </a:extLst>
-          </p:cNvPr>
-          <p:cNvCxnSpPr>
-            <a:cxnSpLocks noGrp="1" noRot="1" noChangeAspect="1" noMove="1" noResize="1" noEditPoints="1" noAdjustHandles="1" noChangeArrowheads="1" noChangeShapeType="1"/>
-          </p:cNvCxnSpPr>
-          <p:nvPr>
-            <p:extLst>
-              <p:ext uri="{386F3935-93C4-4BCD-93E2-E3B085C9AB24}">
-                <p16:designElem xmlns:p16="http://schemas.microsoft.com/office/powerpoint/2015/main" val="1"/>
-              </p:ext>
-            </p:extLst>
-          </p:nvPr>
-        </p:nvCxnSpPr>
-        <p:spPr>
-          <a:xfrm>
-            <a:off x="8139605" y="1600200"/>
-            <a:ext cx="0" cy="3657600"/>
-          </a:xfrm>
-          <a:prstGeom prst="line">
-            <a:avLst/>
-          </a:prstGeom>
-          <a:ln w="19050">
-            <a:solidFill>
-              <a:schemeClr val="accent1">
-                <a:lumMod val="75000"/>
-              </a:schemeClr>
-            </a:solidFill>
-          </a:ln>
-        </p:spPr>
-        <p:style>
-          <a:lnRef idx="1">
-            <a:schemeClr val="accent1"/>
-          </a:lnRef>
-          <a:fillRef idx="0">
-            <a:schemeClr val="accent1"/>
-          </a:fillRef>
-          <a:effectRef idx="0">
-            <a:schemeClr val="accent1"/>
-          </a:effectRef>
-          <a:fontRef idx="minor">
-            <a:schemeClr val="tx1"/>
-          </a:fontRef>
-        </p:style>
-      </p:cxnSp>
-    </p:spTree>
-    <p:extLst>
-      <p:ext uri="{BB962C8B-B14F-4D97-AF65-F5344CB8AC3E}">
-        <p14:creationId xmlns:p14="http://schemas.microsoft.com/office/powerpoint/2010/main" val="3404392292"/>
-      </p:ext>
-    </p:extLst>
-  </p:cSld>
-  <p:clrMapOvr>
-    <a:masterClrMapping/>
-  </p:clrMapOvr>
-</p:sld>
-</file>
-
 <file path=ppt/slides/slide12.xml><?xml version="1.0" encoding="utf-8"?>
 <p:sld xmlns:a="http://schemas.openxmlformats.org/drawingml/2006/main" xmlns:r="http://schemas.openxmlformats.org/officeDocument/2006/relationships" xmlns:p="http://schemas.openxmlformats.org/presentationml/2006/main">
   <p:cSld>
@@ -6123,6 +6060,204 @@
           <p:cNvPr id="2" name="Textfeld 1">
             <a:extLst>
               <a:ext uri="{FF2B5EF4-FFF2-40B4-BE49-F238E27FC236}">
+                <a16:creationId xmlns:a16="http://schemas.microsoft.com/office/drawing/2014/main" id="{91CF4895-9E43-4451-AD30-62BB9C62C0DB}"/>
+              </a:ext>
+            </a:extLst>
+          </p:cNvPr>
+          <p:cNvSpPr txBox="1"/>
+          <p:nvPr/>
+        </p:nvSpPr>
+        <p:spPr>
+          <a:xfrm>
+            <a:off x="685800" y="795528"/>
+            <a:ext cx="184731" cy="369332"/>
+          </a:xfrm>
+          <a:prstGeom prst="rect">
+            <a:avLst/>
+          </a:prstGeom>
+          <a:noFill/>
+        </p:spPr>
+        <p:txBody>
+          <a:bodyPr wrap="none" rtlCol="0">
+            <a:spAutoFit/>
+          </a:bodyPr>
+          <a:lstStyle/>
+          <a:p>
+            <a:endParaRPr lang="de-DE" dirty="0"/>
+          </a:p>
+        </p:txBody>
+      </p:sp>
+    </p:spTree>
+    <p:extLst>
+      <p:ext uri="{BB962C8B-B14F-4D97-AF65-F5344CB8AC3E}">
+        <p14:creationId xmlns:p14="http://schemas.microsoft.com/office/powerpoint/2010/main" val="3516916557"/>
+      </p:ext>
+    </p:extLst>
+  </p:cSld>
+  <p:clrMapOvr>
+    <a:masterClrMapping/>
+  </p:clrMapOvr>
+</p:sld>
+</file>
+
+<file path=ppt/slides/slide14.xml><?xml version="1.0" encoding="utf-8"?>
+<p:sld xmlns:a="http://schemas.openxmlformats.org/drawingml/2006/main" xmlns:r="http://schemas.openxmlformats.org/officeDocument/2006/relationships" xmlns:p="http://schemas.openxmlformats.org/presentationml/2006/main">
+  <p:cSld>
+    <p:bg>
+      <p:bgPr>
+        <a:solidFill>
+          <a:srgbClr val="4960A6"/>
+        </a:solidFill>
+        <a:effectLst/>
+      </p:bgPr>
+    </p:bg>
+    <p:spTree>
+      <p:nvGrpSpPr>
+        <p:cNvPr id="1" name=""/>
+        <p:cNvGrpSpPr/>
+        <p:nvPr/>
+      </p:nvGrpSpPr>
+      <p:grpSpPr>
+        <a:xfrm>
+          <a:off x="0" y="0"/>
+          <a:ext cx="0" cy="0"/>
+          <a:chOff x="0" y="0"/>
+          <a:chExt cx="0" cy="0"/>
+        </a:xfrm>
+      </p:grpSpPr>
+      <p:sp>
+        <p:nvSpPr>
+          <p:cNvPr id="22" name="Rectangle 21">
+            <a:extLst>
+              <a:ext uri="{FF2B5EF4-FFF2-40B4-BE49-F238E27FC236}">
+                <a16:creationId xmlns:a16="http://schemas.microsoft.com/office/drawing/2014/main" id="{44B3F5F5-166C-4694-B20A-3F8218AF7D03}"/>
+              </a:ext>
+              <a:ext uri="{C183D7F6-B498-43B3-948B-1728B52AA6E4}">
+                <adec:decorative xmlns:adec="http://schemas.microsoft.com/office/drawing/2017/decorative" val="1"/>
+              </a:ext>
+            </a:extLst>
+          </p:cNvPr>
+          <p:cNvSpPr>
+            <a:spLocks noGrp="1" noRot="1" noChangeAspect="1" noMove="1" noResize="1" noEditPoints="1" noAdjustHandles="1" noChangeArrowheads="1" noChangeShapeType="1" noTextEdit="1"/>
+          </p:cNvSpPr>
+          <p:nvPr>
+            <p:extLst>
+              <p:ext uri="{386F3935-93C4-4BCD-93E2-E3B085C9AB24}">
+                <p16:designElem xmlns:p16="http://schemas.microsoft.com/office/powerpoint/2015/main" val="1"/>
+              </p:ext>
+            </p:extLst>
+          </p:nvPr>
+        </p:nvSpPr>
+        <p:spPr>
+          <a:xfrm>
+            <a:off x="0" y="0"/>
+            <a:ext cx="12192000" cy="6858000"/>
+          </a:xfrm>
+          <a:prstGeom prst="rect">
+            <a:avLst/>
+          </a:prstGeom>
+          <a:solidFill>
+            <a:schemeClr val="bg2"/>
+          </a:solidFill>
+          <a:ln>
+            <a:noFill/>
+          </a:ln>
+        </p:spPr>
+        <p:style>
+          <a:lnRef idx="2">
+            <a:schemeClr val="accent1">
+              <a:shade val="50000"/>
+            </a:schemeClr>
+          </a:lnRef>
+          <a:fillRef idx="1">
+            <a:schemeClr val="accent1"/>
+          </a:fillRef>
+          <a:effectRef idx="0">
+            <a:schemeClr val="accent1"/>
+          </a:effectRef>
+          <a:fontRef idx="minor">
+            <a:schemeClr val="lt1"/>
+          </a:fontRef>
+        </p:style>
+        <p:txBody>
+          <a:bodyPr rtlCol="0" anchor="ctr"/>
+          <a:lstStyle/>
+          <a:p>
+            <a:pPr algn="ctr"/>
+            <a:endParaRPr lang="en-US"/>
+          </a:p>
+        </p:txBody>
+      </p:sp>
+      <p:sp>
+        <p:nvSpPr>
+          <p:cNvPr id="24" name="Rectangle 23">
+            <a:extLst>
+              <a:ext uri="{FF2B5EF4-FFF2-40B4-BE49-F238E27FC236}">
+                <a16:creationId xmlns:a16="http://schemas.microsoft.com/office/drawing/2014/main" id="{9E67A204-FB90-4B26-B155-3FA8064AD2DF}"/>
+              </a:ext>
+              <a:ext uri="{C183D7F6-B498-43B3-948B-1728B52AA6E4}">
+                <adec:decorative xmlns:adec="http://schemas.microsoft.com/office/drawing/2017/decorative" val="1"/>
+              </a:ext>
+            </a:extLst>
+          </p:cNvPr>
+          <p:cNvSpPr>
+            <a:spLocks noGrp="1" noRot="1" noChangeAspect="1" noMove="1" noResize="1" noEditPoints="1" noAdjustHandles="1" noChangeArrowheads="1" noChangeShapeType="1" noTextEdit="1"/>
+          </p:cNvSpPr>
+          <p:nvPr>
+            <p:extLst>
+              <p:ext uri="{386F3935-93C4-4BCD-93E2-E3B085C9AB24}">
+                <p16:designElem xmlns:p16="http://schemas.microsoft.com/office/powerpoint/2015/main" val="1"/>
+              </p:ext>
+            </p:extLst>
+          </p:nvPr>
+        </p:nvSpPr>
+        <p:spPr>
+          <a:xfrm>
+            <a:off x="477012" y="480060"/>
+            <a:ext cx="11237976" cy="5897880"/>
+          </a:xfrm>
+          <a:prstGeom prst="rect">
+            <a:avLst/>
+          </a:prstGeom>
+          <a:solidFill>
+            <a:schemeClr val="bg1"/>
+          </a:solidFill>
+          <a:ln w="22225">
+            <a:solidFill>
+              <a:srgbClr val="C17F63"/>
+            </a:solidFill>
+          </a:ln>
+        </p:spPr>
+        <p:style>
+          <a:lnRef idx="2">
+            <a:schemeClr val="accent1">
+              <a:shade val="50000"/>
+            </a:schemeClr>
+          </a:lnRef>
+          <a:fillRef idx="1">
+            <a:schemeClr val="accent1"/>
+          </a:fillRef>
+          <a:effectRef idx="0">
+            <a:schemeClr val="accent1"/>
+          </a:effectRef>
+          <a:fontRef idx="minor">
+            <a:schemeClr val="lt1"/>
+          </a:fontRef>
+        </p:style>
+        <p:txBody>
+          <a:bodyPr rtlCol="0" anchor="ctr"/>
+          <a:lstStyle/>
+          <a:p>
+            <a:pPr algn="ctr"/>
+            <a:endParaRPr lang="en-US"/>
+          </a:p>
+        </p:txBody>
+      </p:sp>
+      <p:sp>
+        <p:nvSpPr>
+          <p:cNvPr id="2" name="Textfeld 1">
+            <a:extLst>
+              <a:ext uri="{FF2B5EF4-FFF2-40B4-BE49-F238E27FC236}">
                 <a16:creationId xmlns:a16="http://schemas.microsoft.com/office/drawing/2014/main" id="{D64EE381-6CA3-448B-B861-218962D3B872}"/>
               </a:ext>
             </a:extLst>
@@ -6872,8 +7007,8 @@
         </p:nvSpPr>
         <p:spPr>
           <a:xfrm>
-            <a:off x="5618988" y="3429000"/>
-            <a:ext cx="6096000" cy="1938992"/>
+            <a:off x="5738241" y="4125980"/>
+            <a:ext cx="6096000" cy="1569660"/>
           </a:xfrm>
           <a:prstGeom prst="rect">
             <a:avLst/>
@@ -6888,13 +7023,7 @@
           <a:p>
             <a:r>
               <a:rPr lang="de-DE" sz="2400" dirty="0"/>
-              <a:t>Teammitglieder:</a:t>
-            </a:r>
-          </a:p>
-          <a:p>
-            <a:r>
-              <a:rPr lang="de-DE" sz="2400" dirty="0"/>
-              <a:t>Leon Schwarz – CEO/Teamleitung</a:t>
+              <a:t>Leon Schwarz 		 – CEO/Teamleitung</a:t>
             </a:r>
           </a:p>
           <a:p>
@@ -6914,13 +7043,13 @@
           <a:p>
             <a:r>
               <a:rPr lang="de-DE" sz="2400" dirty="0"/>
-              <a:t>Tobias Röpke – technischer Leiter</a:t>
+              <a:t>Tobias Röpke 		 – technischer Leiter</a:t>
             </a:r>
           </a:p>
           <a:p>
             <a:r>
               <a:rPr lang="de-DE" sz="2400" dirty="0"/>
-              <a:t>Philipp Otto – Marketing </a:t>
+              <a:t>Philipp Otto 		 – Marketing </a:t>
             </a:r>
           </a:p>
         </p:txBody>
@@ -6939,8 +7068,8 @@
         </p:nvSpPr>
         <p:spPr>
           <a:xfrm>
-            <a:off x="1428750" y="1219200"/>
-            <a:ext cx="4430508" cy="1477328"/>
+            <a:off x="721119" y="4172146"/>
+            <a:ext cx="4778616" cy="1477328"/>
           </a:xfrm>
           <a:prstGeom prst="rect">
             <a:avLst/>
@@ -6955,23 +7084,134 @@
           <a:p>
             <a:r>
               <a:rPr lang="de-DE" sz="2400" dirty="0"/>
-              <a:t>Gründung: Oktober 2020</a:t>
+              <a:t>Gründung: 		Oktober 2020</a:t>
             </a:r>
           </a:p>
           <a:p>
             <a:r>
               <a:rPr lang="de-DE" sz="2400" dirty="0"/>
-              <a:t>Mitarbeiter: 4</a:t>
+              <a:t>Mitarbeiter: 	4</a:t>
             </a:r>
           </a:p>
           <a:p>
             <a:r>
               <a:rPr lang="de-DE" sz="2400" dirty="0"/>
-              <a:t>geschätzter Firmenwert: 200.000€</a:t>
+              <a:t>geschätzter 	Firmenwert: 200.000€</a:t>
             </a:r>
           </a:p>
           <a:p>
             <a:endParaRPr lang="de-DE" dirty="0"/>
+          </a:p>
+        </p:txBody>
+      </p:sp>
+      <p:sp>
+        <p:nvSpPr>
+          <p:cNvPr id="3" name="Textfeld 2">
+            <a:extLst>
+              <a:ext uri="{FF2B5EF4-FFF2-40B4-BE49-F238E27FC236}">
+                <a16:creationId xmlns:a16="http://schemas.microsoft.com/office/drawing/2014/main" id="{6392A4D7-C13D-46D3-B54C-2C678BB5956C}"/>
+              </a:ext>
+            </a:extLst>
+          </p:cNvPr>
+          <p:cNvSpPr txBox="1"/>
+          <p:nvPr/>
+        </p:nvSpPr>
+        <p:spPr>
+          <a:xfrm>
+            <a:off x="3260801" y="1126390"/>
+            <a:ext cx="5670398" cy="1292662"/>
+          </a:xfrm>
+          <a:prstGeom prst="rect">
+            <a:avLst/>
+          </a:prstGeom>
+          <a:noFill/>
+        </p:spPr>
+        <p:txBody>
+          <a:bodyPr wrap="none" rtlCol="0">
+            <a:spAutoFit/>
+          </a:bodyPr>
+          <a:lstStyle/>
+          <a:p>
+            <a:r>
+              <a:rPr lang="de-DE" sz="5400" dirty="0"/>
+              <a:t>				C-Tech </a:t>
+            </a:r>
+          </a:p>
+          <a:p>
+            <a:r>
+              <a:rPr lang="de-DE" sz="2400" dirty="0"/>
+              <a:t>„modern </a:t>
+            </a:r>
+            <a:r>
+              <a:rPr lang="de-DE" sz="2400" dirty="0" err="1"/>
+              <a:t>problems</a:t>
+            </a:r>
+            <a:r>
+              <a:rPr lang="de-DE" sz="2400" dirty="0"/>
+              <a:t> </a:t>
+            </a:r>
+            <a:r>
+              <a:rPr lang="de-DE" sz="2400" dirty="0" err="1"/>
+              <a:t>require</a:t>
+            </a:r>
+            <a:r>
+              <a:rPr lang="de-DE" sz="2400" dirty="0"/>
+              <a:t> </a:t>
+            </a:r>
+            <a:r>
+              <a:rPr lang="de-DE" sz="2400" dirty="0" err="1"/>
+              <a:t>creative</a:t>
+            </a:r>
+            <a:r>
+              <a:rPr lang="de-DE" sz="2400" dirty="0"/>
+              <a:t> </a:t>
+            </a:r>
+            <a:r>
+              <a:rPr lang="de-DE" sz="2400" dirty="0" err="1"/>
+              <a:t>solutions</a:t>
+            </a:r>
+            <a:r>
+              <a:rPr lang="de-DE" sz="2400" dirty="0"/>
+              <a:t>“</a:t>
+            </a:r>
+          </a:p>
+        </p:txBody>
+      </p:sp>
+      <p:sp>
+        <p:nvSpPr>
+          <p:cNvPr id="4" name="Textfeld 3">
+            <a:extLst>
+              <a:ext uri="{FF2B5EF4-FFF2-40B4-BE49-F238E27FC236}">
+                <a16:creationId xmlns:a16="http://schemas.microsoft.com/office/drawing/2014/main" id="{BBC71AB5-CA65-40C6-81CE-CC0F145BA1A5}"/>
+              </a:ext>
+            </a:extLst>
+          </p:cNvPr>
+          <p:cNvSpPr txBox="1"/>
+          <p:nvPr/>
+        </p:nvSpPr>
+        <p:spPr>
+          <a:xfrm>
+            <a:off x="5738241" y="3756647"/>
+            <a:ext cx="1604350" cy="830997"/>
+          </a:xfrm>
+          <a:prstGeom prst="rect">
+            <a:avLst/>
+          </a:prstGeom>
+          <a:noFill/>
+        </p:spPr>
+        <p:txBody>
+          <a:bodyPr wrap="none" rtlCol="0">
+            <a:spAutoFit/>
+          </a:bodyPr>
+          <a:lstStyle/>
+          <a:p>
+            <a:r>
+              <a:rPr lang="de-DE" sz="2400" dirty="0"/>
+              <a:t>unser Team:</a:t>
+            </a:r>
+          </a:p>
+          <a:p>
+            <a:endParaRPr lang="de-DE" sz="2400" dirty="0"/>
           </a:p>
         </p:txBody>
       </p:sp>
@@ -8558,21 +8798,21 @@
           <a:chExt cx="0" cy="0"/>
         </a:xfrm>
       </p:grpSpPr>
-      <p:sp>
-        <p:nvSpPr>
-          <p:cNvPr id="22" name="Rectangle 21">
+      <p:cxnSp>
+        <p:nvCxnSpPr>
+          <p:cNvPr id="7" name="Straight Connector 6">
             <a:extLst>
               <a:ext uri="{FF2B5EF4-FFF2-40B4-BE49-F238E27FC236}">
-                <a16:creationId xmlns:a16="http://schemas.microsoft.com/office/drawing/2014/main" id="{44B3F5F5-166C-4694-B20A-3F8218AF7D03}"/>
+                <a16:creationId xmlns:a16="http://schemas.microsoft.com/office/drawing/2014/main" id="{8CED2307-F79F-42F9-B81B-91F768E72BFC}"/>
               </a:ext>
               <a:ext uri="{C183D7F6-B498-43B3-948B-1728B52AA6E4}">
                 <adec:decorative xmlns:adec="http://schemas.microsoft.com/office/drawing/2017/decorative" val="1"/>
               </a:ext>
             </a:extLst>
           </p:cNvPr>
-          <p:cNvSpPr>
-            <a:spLocks noGrp="1" noRot="1" noChangeAspect="1" noMove="1" noResize="1" noEditPoints="1" noAdjustHandles="1" noChangeArrowheads="1" noChangeShapeType="1" noTextEdit="1"/>
-          </p:cNvSpPr>
+          <p:cNvCxnSpPr>
+            <a:cxnSpLocks noGrp="1" noRot="1" noChangeAspect="1" noMove="1" noResize="1" noEditPoints="1" noAdjustHandles="1" noChangeArrowheads="1" noChangeShapeType="1"/>
+          </p:cNvCxnSpPr>
           <p:nvPr>
             <p:extLst>
               <p:ext uri="{386F3935-93C4-4BCD-93E2-E3B085C9AB24}">
@@ -8580,17 +8820,69 @@
               </p:ext>
             </p:extLst>
           </p:nvPr>
+        </p:nvCxnSpPr>
+        <p:spPr>
+          <a:xfrm flipV="1">
+            <a:off x="8386842" y="5264106"/>
+            <a:ext cx="0" cy="914400"/>
+          </a:xfrm>
+          <a:prstGeom prst="line">
+            <a:avLst/>
+          </a:prstGeom>
+          <a:ln w="19050">
+            <a:solidFill>
+              <a:schemeClr val="accent2"/>
+            </a:solidFill>
+          </a:ln>
+        </p:spPr>
+        <p:style>
+          <a:lnRef idx="1">
+            <a:schemeClr val="accent1"/>
+          </a:lnRef>
+          <a:fillRef idx="0">
+            <a:schemeClr val="accent1"/>
+          </a:fillRef>
+          <a:effectRef idx="0">
+            <a:schemeClr val="accent1"/>
+          </a:effectRef>
+          <a:fontRef idx="minor">
+            <a:schemeClr val="tx1"/>
+          </a:fontRef>
+        </p:style>
+      </p:cxnSp>
+      <p:sp>
+        <p:nvSpPr>
+          <p:cNvPr id="9" name="Rectangle 8">
+            <a:extLst>
+              <a:ext uri="{FF2B5EF4-FFF2-40B4-BE49-F238E27FC236}">
+                <a16:creationId xmlns:a16="http://schemas.microsoft.com/office/drawing/2014/main" id="{E5DB38FF-CE38-4D82-B9F2-DFE28A0194E1}"/>
+              </a:ext>
+              <a:ext uri="{C183D7F6-B498-43B3-948B-1728B52AA6E4}">
+                <adec:decorative xmlns:adec="http://schemas.microsoft.com/office/drawing/2017/decorative" val="1"/>
+              </a:ext>
+            </a:extLst>
+          </p:cNvPr>
+          <p:cNvSpPr>
+            <a:spLocks noGrp="1" noRot="1" noChangeAspect="1" noMove="1" noResize="1" noEditPoints="1" noAdjustHandles="1" noChangeArrowheads="1" noChangeShapeType="1" noTextEdit="1"/>
+          </p:cNvSpPr>
+          <p:nvPr>
+            <p:extLst>
+              <p:ext uri="{386F3935-93C4-4BCD-93E2-E3B085C9AB24}">
+                <p16:designElem xmlns:p16="http://schemas.microsoft.com/office/powerpoint/2015/main" val="1"/>
+              </p:ext>
+            </p:extLst>
+          </p:nvPr>
         </p:nvSpPr>
         <p:spPr>
           <a:xfrm>
-            <a:off x="0" y="0"/>
-            <a:ext cx="12192000" cy="6858000"/>
+            <a:off x="0" y="-1"/>
+            <a:ext cx="12192000" cy="4572001"/>
           </a:xfrm>
           <a:prstGeom prst="rect">
             <a:avLst/>
           </a:prstGeom>
           <a:solidFill>
-            <a:schemeClr val="bg2"/>
+            <a:schemeClr val="accent2"/>
           </a:solidFill>
           <a:ln>
             <a:noFill/>
@@ -8612,21 +8904,13 @@
             <a:schemeClr val="lt1"/>
           </a:fontRef>
         </p:style>
-        <p:txBody>
-          <a:bodyPr rtlCol="0" anchor="ctr"/>
-          <a:lstStyle/>
-          <a:p>
-            <a:pPr algn="ctr"/>
-            <a:endParaRPr lang="en-US"/>
-          </a:p>
-        </p:txBody>
-      </p:sp>
-      <p:sp>
-        <p:nvSpPr>
-          <p:cNvPr id="24" name="Rectangle 23">
+      </p:sp>
+      <p:sp useBgFill="1">
+        <p:nvSpPr>
+          <p:cNvPr id="11" name="Rectangle 10">
             <a:extLst>
               <a:ext uri="{FF2B5EF4-FFF2-40B4-BE49-F238E27FC236}">
-                <a16:creationId xmlns:a16="http://schemas.microsoft.com/office/drawing/2014/main" id="{9E67A204-FB90-4B26-B155-3FA8064AD2DF}"/>
+                <a16:creationId xmlns:a16="http://schemas.microsoft.com/office/drawing/2014/main" id="{0BA28970-3E8F-46CD-A302-42EE83668B0A}"/>
               </a:ext>
               <a:ext uri="{C183D7F6-B498-43B3-948B-1728B52AA6E4}">
                 <adec:decorative xmlns:adec="http://schemas.microsoft.com/office/drawing/2017/decorative" val="1"/>
@@ -8646,19 +8930,14 @@
         </p:nvSpPr>
         <p:spPr>
           <a:xfrm>
-            <a:off x="477012" y="480060"/>
-            <a:ext cx="11237976" cy="5897880"/>
+            <a:off x="0" y="0"/>
+            <a:ext cx="12192000" cy="6858000"/>
           </a:xfrm>
           <a:prstGeom prst="rect">
             <a:avLst/>
           </a:prstGeom>
-          <a:solidFill>
-            <a:schemeClr val="bg1"/>
-          </a:solidFill>
-          <a:ln w="22225">
-            <a:solidFill>
-              <a:srgbClr val="C17F63"/>
-            </a:solidFill>
+          <a:ln>
+            <a:noFill/>
           </a:ln>
         </p:spPr>
         <p:style>
@@ -8686,81 +8965,106 @@
           </a:p>
         </p:txBody>
       </p:sp>
-      <p:pic>
-        <p:nvPicPr>
-          <p:cNvPr id="3" name="Grafik 2" descr="Ein Bild, das schwimmend, grün, sitzend, haltend enthält.&#10;&#10;Automatisch generierte Beschreibung">
+      <p:sp>
+        <p:nvSpPr>
+          <p:cNvPr id="2" name="Titel 1">
             <a:extLst>
               <a:ext uri="{FF2B5EF4-FFF2-40B4-BE49-F238E27FC236}">
-                <a16:creationId xmlns:a16="http://schemas.microsoft.com/office/drawing/2014/main" id="{79A94BF5-5C1D-4210-B325-A8962E06FB12}"/>
+                <a16:creationId xmlns:a16="http://schemas.microsoft.com/office/drawing/2014/main" id="{9EE936F0-62E4-40F1-BA06-11DDD134B512}"/>
               </a:ext>
             </a:extLst>
           </p:cNvPr>
-          <p:cNvPicPr>
-            <a:picLocks noChangeAspect="1"/>
-          </p:cNvPicPr>
-          <p:nvPr/>
-        </p:nvPicPr>
-        <p:blipFill>
-          <a:blip r:embed="rId2">
-            <a:extLst>
-              <a:ext uri="{28A0092B-C50C-407E-A947-70E740481C1C}">
-                <a14:useLocalDpi xmlns:a14="http://schemas.microsoft.com/office/drawing/2010/main" val="0"/>
-              </a:ext>
-            </a:extLst>
-          </a:blip>
-          <a:stretch>
-            <a:fillRect/>
-          </a:stretch>
-        </p:blipFill>
+          <p:cNvSpPr>
+            <a:spLocks noGrp="1"/>
+          </p:cNvSpPr>
+          <p:nvPr>
+            <p:ph type="title" idx="4294967295"/>
+          </p:nvPr>
+        </p:nvSpPr>
         <p:spPr>
           <a:xfrm>
-            <a:off x="1153668" y="1263115"/>
-            <a:ext cx="9884664" cy="5073075"/>
-          </a:xfrm>
-          <a:prstGeom prst="rect">
-            <a:avLst/>
-          </a:prstGeom>
-        </p:spPr>
-      </p:pic>
-      <p:sp>
-        <p:nvSpPr>
-          <p:cNvPr id="4" name="Textfeld 3">
+            <a:off x="643467" y="643467"/>
+            <a:ext cx="7164674" cy="5571066"/>
+          </a:xfrm>
+        </p:spPr>
+        <p:txBody>
+          <a:bodyPr vert="horz" lIns="91440" tIns="45720" rIns="91440" bIns="45720" rtlCol="0" anchor="ctr">
+            <a:normAutofit/>
+          </a:bodyPr>
+          <a:lstStyle/>
+          <a:p>
+            <a:pPr algn="r"/>
+            <a:r>
+              <a:rPr lang="en-US" sz="6600" spc="200">
+                <a:solidFill>
+                  <a:schemeClr val="tx1">
+                    <a:alpha val="80000"/>
+                  </a:schemeClr>
+                </a:solidFill>
+              </a:rPr>
+              <a:t>Wie können wir das erreichen?</a:t>
+            </a:r>
+          </a:p>
+        </p:txBody>
+      </p:sp>
+      <p:cxnSp>
+        <p:nvCxnSpPr>
+          <p:cNvPr id="13" name="Straight Connector 12">
             <a:extLst>
               <a:ext uri="{FF2B5EF4-FFF2-40B4-BE49-F238E27FC236}">
-                <a16:creationId xmlns:a16="http://schemas.microsoft.com/office/drawing/2014/main" id="{E5DEB3FE-FEC3-4ACC-B79E-F749C8194B3C}"/>
+                <a16:creationId xmlns:a16="http://schemas.microsoft.com/office/drawing/2014/main" id="{47AE7893-212D-45CB-A5B0-AE377389AB3F}"/>
+              </a:ext>
+              <a:ext uri="{C183D7F6-B498-43B3-948B-1728B52AA6E4}">
+                <adec:decorative xmlns:adec="http://schemas.microsoft.com/office/drawing/2017/decorative" val="1"/>
               </a:ext>
             </a:extLst>
           </p:cNvPr>
-          <p:cNvSpPr txBox="1"/>
-          <p:nvPr/>
-        </p:nvSpPr>
+          <p:cNvCxnSpPr>
+            <a:cxnSpLocks noGrp="1" noRot="1" noChangeAspect="1" noMove="1" noResize="1" noEditPoints="1" noAdjustHandles="1" noChangeArrowheads="1" noChangeShapeType="1"/>
+          </p:cNvCxnSpPr>
+          <p:nvPr>
+            <p:extLst>
+              <p:ext uri="{386F3935-93C4-4BCD-93E2-E3B085C9AB24}">
+                <p16:designElem xmlns:p16="http://schemas.microsoft.com/office/powerpoint/2015/main" val="1"/>
+              </p:ext>
+            </p:extLst>
+          </p:nvPr>
+        </p:nvCxnSpPr>
         <p:spPr>
           <a:xfrm>
-            <a:off x="3582876" y="640755"/>
-            <a:ext cx="5026248" cy="461665"/>
-          </a:xfrm>
-          <a:prstGeom prst="rect">
+            <a:off x="8139605" y="1600200"/>
+            <a:ext cx="0" cy="3657600"/>
+          </a:xfrm>
+          <a:prstGeom prst="line">
             <a:avLst/>
           </a:prstGeom>
-          <a:noFill/>
-        </p:spPr>
-        <p:txBody>
-          <a:bodyPr wrap="none" rtlCol="0">
-            <a:spAutoFit/>
-          </a:bodyPr>
-          <a:lstStyle/>
-          <a:p>
-            <a:r>
-              <a:rPr lang="de-DE" sz="2400" dirty="0"/>
-              <a:t>Vollständig automatisierte Algenfarmen</a:t>
-            </a:r>
-          </a:p>
-        </p:txBody>
-      </p:sp>
+          <a:ln w="19050">
+            <a:solidFill>
+              <a:schemeClr val="accent1">
+                <a:lumMod val="75000"/>
+              </a:schemeClr>
+            </a:solidFill>
+          </a:ln>
+        </p:spPr>
+        <p:style>
+          <a:lnRef idx="1">
+            <a:schemeClr val="accent1"/>
+          </a:lnRef>
+          <a:fillRef idx="0">
+            <a:schemeClr val="accent1"/>
+          </a:fillRef>
+          <a:effectRef idx="0">
+            <a:schemeClr val="accent1"/>
+          </a:effectRef>
+          <a:fontRef idx="minor">
+            <a:schemeClr val="tx1"/>
+          </a:fontRef>
+        </p:style>
+      </p:cxnSp>
     </p:spTree>
     <p:extLst>
       <p:ext uri="{BB962C8B-B14F-4D97-AF65-F5344CB8AC3E}">
-        <p14:creationId xmlns:p14="http://schemas.microsoft.com/office/powerpoint/2010/main" val="112858198"/>
+        <p14:creationId xmlns:p14="http://schemas.microsoft.com/office/powerpoint/2010/main" val="3404392292"/>
       </p:ext>
     </p:extLst>
   </p:cSld>

</xml_diff>